<commit_message>
Added diagrams for AddOrderCommand and edited some descriptions
</commit_message>
<xml_diff>
--- a/docs/diagrams/UiComponentClassDiagramUpdated.pptx
+++ b/docs/diagrams/UiComponentClassDiagramUpdated.pptx
@@ -5,11 +5,10 @@
     <p:sldMasterId id="2147483648" r:id="rId1"/>
   </p:sldMasterIdLst>
   <p:notesMasterIdLst>
-    <p:notesMasterId r:id="rId4"/>
+    <p:notesMasterId r:id="rId3"/>
   </p:notesMasterIdLst>
   <p:sldIdLst>
     <p:sldId id="260" r:id="rId2"/>
-    <p:sldId id="261" r:id="rId3"/>
   </p:sldIdLst>
   <p:sldSz cx="9144000" cy="6858000" type="screen4x3"/>
   <p:notesSz cx="6858000" cy="9144000"/>
@@ -4400,8 +4399,8 @@
         </p:nvCxnSpPr>
         <p:spPr>
           <a:xfrm rot="16200000" flipH="1">
-            <a:off x="570266" y="4060081"/>
-            <a:ext cx="3670598" cy="469200"/>
+            <a:off x="645503" y="4135318"/>
+            <a:ext cx="3442000" cy="547323"/>
           </a:xfrm>
           <a:prstGeom prst="bentConnector2">
             <a:avLst/>
@@ -5547,17 +5546,7 @@
                     </a:schemeClr>
                   </a:solidFill>
                 </a:rPr>
-                <a:t>Order</a:t>
-              </a:r>
-              <a:r>
-                <a:rPr lang="en-US" sz="1050" b="1" dirty="0" err="1" smtClean="0">
-                  <a:solidFill>
-                    <a:schemeClr val="accent3">
-                      <a:lumMod val="75000"/>
-                    </a:schemeClr>
-                  </a:solidFill>
-                </a:rPr>
-                <a:t>ListPanel</a:t>
+                <a:t>OrderListPanel</a:t>
               </a:r>
               <a:endParaRPr lang="en-SG" sz="1050" b="1" dirty="0">
                 <a:solidFill>
@@ -5617,17 +5606,7 @@
                     </a:schemeClr>
                   </a:solidFill>
                 </a:rPr>
-                <a:t>Order</a:t>
-              </a:r>
-              <a:r>
-                <a:rPr lang="en-US" sz="1050" b="1" dirty="0" err="1" smtClean="0">
-                  <a:solidFill>
-                    <a:schemeClr val="accent3">
-                      <a:lumMod val="75000"/>
-                    </a:schemeClr>
-                  </a:solidFill>
-                </a:rPr>
-                <a:t>Card</a:t>
+                <a:t>OrderCard</a:t>
               </a:r>
               <a:endParaRPr lang="en-SG" sz="1050" b="1" dirty="0">
                 <a:solidFill>
@@ -6231,17 +6210,7 @@
                   </a:schemeClr>
                 </a:solidFill>
               </a:rPr>
-              <a:t>Right</a:t>
-            </a:r>
-            <a:r>
-              <a:rPr lang="en-US" sz="1050" b="1" dirty="0" err="1" smtClean="0">
-                <a:solidFill>
-                  <a:schemeClr val="accent3">
-                    <a:lumMod val="75000"/>
-                  </a:schemeClr>
-                </a:solidFill>
-              </a:rPr>
-              <a:t>Panel</a:t>
+              <a:t>RightPanel</a:t>
             </a:r>
             <a:endParaRPr lang="en-SG" sz="1050" b="1" dirty="0">
               <a:solidFill>
@@ -6427,17 +6396,7 @@
                   </a:schemeClr>
                 </a:solidFill>
               </a:rPr>
-              <a:t>Person</a:t>
-            </a:r>
-            <a:r>
-              <a:rPr lang="en-US" sz="1050" b="1" smtClean="0">
-                <a:solidFill>
-                  <a:schemeClr val="accent3">
-                    <a:lumMod val="75000"/>
-                  </a:schemeClr>
-                </a:solidFill>
-              </a:rPr>
-              <a:t>Panel</a:t>
+              <a:t>PersonPanel</a:t>
             </a:r>
             <a:endParaRPr lang="en-SG" sz="1050" b="1" dirty="0">
               <a:solidFill>
@@ -6775,36 +6734,6 @@
     <p:extLst>
       <p:ext uri="{BB962C8B-B14F-4D97-AF65-F5344CB8AC3E}">
         <p14:creationId xmlns:p14="http://schemas.microsoft.com/office/powerpoint/2010/main" val="2776882492"/>
-      </p:ext>
-    </p:extLst>
-  </p:cSld>
-  <p:clrMapOvr>
-    <a:masterClrMapping/>
-  </p:clrMapOvr>
-</p:sld>
-</file>
-
-<file path=ppt/slides/slide2.xml><?xml version="1.0" encoding="utf-8"?>
-<p:sld xmlns:a="http://schemas.openxmlformats.org/drawingml/2006/main" xmlns:r="http://schemas.openxmlformats.org/officeDocument/2006/relationships" xmlns:p="http://schemas.openxmlformats.org/presentationml/2006/main">
-  <p:cSld>
-    <p:spTree>
-      <p:nvGrpSpPr>
-        <p:cNvPr id="1" name=""/>
-        <p:cNvGrpSpPr/>
-        <p:nvPr/>
-      </p:nvGrpSpPr>
-      <p:grpSpPr>
-        <a:xfrm>
-          <a:off x="0" y="0"/>
-          <a:ext cx="0" cy="0"/>
-          <a:chOff x="0" y="0"/>
-          <a:chExt cx="0" cy="0"/>
-        </a:xfrm>
-      </p:grpSpPr>
-    </p:spTree>
-    <p:extLst>
-      <p:ext uri="{BB962C8B-B14F-4D97-AF65-F5344CB8AC3E}">
-        <p14:creationId xmlns:p14="http://schemas.microsoft.com/office/powerpoint/2010/main" val="584515107"/>
       </p:ext>
     </p:extLst>
   </p:cSld>

</xml_diff>